<commit_message>
Add Lecture 11 materials and reorganize lectures
Added new Lecture11_SyntheticControl_CausalML directory with RMarkdown, slides, readings, and data. Renamed and reorganized files for Lectures 8-10.
</commit_message>
<xml_diff>
--- a/Lecture06_Matching/Lecture06_Matching.pptx
+++ b/Lecture06_Matching/Lecture06_Matching.pptx
@@ -487,7 +487,7 @@
           <a:p>
             <a:fld id="{EF911157-0FC2-4F06-8D61-FD647FE4E19D}" type="datetimeFigureOut">
               <a:rPr lang="en-US" smtClean="0"/>
-              <a:t>10/25/2024</a:t>
+              <a:t>10/16/2025</a:t>
             </a:fld>
             <a:endParaRPr lang="en-US"/>
           </a:p>
@@ -819,7 +819,7 @@
             </a:pPr>
             <a:r>
               <a:rPr lang="en-US" dirty="0"/>
-              <a:t>Case studies</a:t>
+              <a:t>Format for Assignment 3</a:t>
             </a:r>
           </a:p>
           <a:p>
@@ -829,7 +829,7 @@
             </a:pPr>
             <a:r>
               <a:rPr lang="en-US" dirty="0"/>
-              <a:t>Format for Assignment 2</a:t>
+              <a:t>Updating lecture schedule – DD coming soon (are we willing to move up due date for Assignment 4 correspondingly?)</a:t>
             </a:r>
           </a:p>
           <a:p>
@@ -839,7 +839,7 @@
             </a:pPr>
             <a:r>
               <a:rPr lang="en-US" dirty="0"/>
-              <a:t>Upcoming seminar series (job talks)</a:t>
+              <a:t>Talk about research projects! </a:t>
             </a:r>
           </a:p>
           <a:p>
@@ -849,27 +849,7 @@
             </a:pPr>
             <a:r>
               <a:rPr lang="en-US" dirty="0"/>
-              <a:t>Final paper/referee reports questions + timelines</a:t>
-            </a:r>
-          </a:p>
-          <a:p>
-            <a:pPr marL="171450" indent="-171450">
-              <a:buFont typeface="Arial" panose="020B0604020202020204" pitchFamily="34" charset="0"/>
-              <a:buChar char="•"/>
-            </a:pPr>
-            <a:r>
-              <a:rPr lang="en-US" dirty="0"/>
-              <a:t>Marking and Notes on Assignment 1: default grade for everything is an A (not an A+, which I rarely give out). In general, your grade will be an A- or an A unless you do really well or really poorly – think about what you want from graduate marks and how that might get in the way of your learning. </a:t>
-            </a:r>
-          </a:p>
-          <a:p>
-            <a:pPr marL="628650" lvl="1" indent="-171450">
-              <a:buFont typeface="Arial" panose="020B0604020202020204" pitchFamily="34" charset="0"/>
-              <a:buChar char="•"/>
-            </a:pPr>
-            <a:r>
-              <a:rPr lang="en-US" dirty="0"/>
-              <a:t>With interaction term, make sure you include the levels and the transformation if appropriate. Highlight #9 in particular, talk about colliders in the DAGs maybe? Are people working together? Cite your teams if so – and also do work together! Some code cross-pollination is a good thing</a:t>
+              <a:t>Marking and Notes on Assignment 1: In general, median grade will be an B+/A-. Talk about balancing grades across Sharmistha. </a:t>
             </a:r>
           </a:p>
         </p:txBody>
@@ -1215,7 +1195,10 @@
           <a:bodyPr/>
           <a:lstStyle/>
           <a:p>
-            <a:endParaRPr lang="en-US" dirty="0"/>
+            <a:r>
+              <a:rPr lang="en-US" dirty="0"/>
+              <a:t>Not an economics paper! And using the CCHS! You’re welcome</a:t>
+            </a:r>
           </a:p>
         </p:txBody>
       </p:sp>
@@ -7470,7 +7453,7 @@
             <a:fld id="{0972D05C-DCFB-4BB6-B49C-AC126BF3ED2C}" type="datetimeFigureOut">
               <a:rPr lang="en-US" smtClean="0"/>
               <a:pPr/>
-              <a:t>10/25/2024</a:t>
+              <a:t>10/16/2025</a:t>
             </a:fld>
             <a:endParaRPr lang="en-US"/>
           </a:p>
@@ -7576,6 +7559,13 @@
             <a:schemeClr val="lt1"/>
           </a:fontRef>
         </p:style>
+        <p:txBody>
+          <a:bodyPr/>
+          <a:lstStyle/>
+          <a:p>
+            <a:endParaRPr lang="en-US"/>
+          </a:p>
+        </p:txBody>
       </p:sp>
     </p:spTree>
     <p:extLst>
@@ -7700,7 +7690,7 @@
             <a:fld id="{0972D05C-DCFB-4BB6-B49C-AC126BF3ED2C}" type="datetimeFigureOut">
               <a:rPr lang="en-US" smtClean="0"/>
               <a:pPr/>
-              <a:t>10/25/2024</a:t>
+              <a:t>10/16/2025</a:t>
             </a:fld>
             <a:endParaRPr lang="en-US"/>
           </a:p>
@@ -7882,7 +7872,7 @@
             <a:fld id="{0972D05C-DCFB-4BB6-B49C-AC126BF3ED2C}" type="datetimeFigureOut">
               <a:rPr lang="en-US" smtClean="0"/>
               <a:pPr/>
-              <a:t>10/25/2024</a:t>
+              <a:t>10/16/2025</a:t>
             </a:fld>
             <a:endParaRPr lang="en-US"/>
           </a:p>
@@ -8054,7 +8044,7 @@
             <a:fld id="{0972D05C-DCFB-4BB6-B49C-AC126BF3ED2C}" type="datetimeFigureOut">
               <a:rPr lang="en-US" smtClean="0"/>
               <a:pPr/>
-              <a:t>10/25/2024</a:t>
+              <a:t>10/16/2025</a:t>
             </a:fld>
             <a:endParaRPr lang="en-US"/>
           </a:p>
@@ -8310,7 +8300,7 @@
             <a:fld id="{0972D05C-DCFB-4BB6-B49C-AC126BF3ED2C}" type="datetimeFigureOut">
               <a:rPr lang="en-US" smtClean="0"/>
               <a:pPr/>
-              <a:t>10/25/2024</a:t>
+              <a:t>10/16/2025</a:t>
             </a:fld>
             <a:endParaRPr lang="en-US"/>
           </a:p>
@@ -8638,7 +8628,7 @@
             <a:fld id="{0972D05C-DCFB-4BB6-B49C-AC126BF3ED2C}" type="datetimeFigureOut">
               <a:rPr lang="en-US" smtClean="0"/>
               <a:pPr/>
-              <a:t>10/25/2024</a:t>
+              <a:t>10/16/2025</a:t>
             </a:fld>
             <a:endParaRPr lang="en-US"/>
           </a:p>
@@ -9091,7 +9081,7 @@
             <a:fld id="{0972D05C-DCFB-4BB6-B49C-AC126BF3ED2C}" type="datetimeFigureOut">
               <a:rPr lang="en-US" smtClean="0"/>
               <a:pPr/>
-              <a:t>10/25/2024</a:t>
+              <a:t>10/16/2025</a:t>
             </a:fld>
             <a:endParaRPr lang="en-US"/>
           </a:p>
@@ -9211,7 +9201,7 @@
             <a:fld id="{0972D05C-DCFB-4BB6-B49C-AC126BF3ED2C}" type="datetimeFigureOut">
               <a:rPr lang="en-US" smtClean="0"/>
               <a:pPr/>
-              <a:t>10/25/2024</a:t>
+              <a:t>10/16/2025</a:t>
             </a:fld>
             <a:endParaRPr lang="en-US"/>
           </a:p>
@@ -9308,7 +9298,7 @@
             <a:fld id="{0972D05C-DCFB-4BB6-B49C-AC126BF3ED2C}" type="datetimeFigureOut">
               <a:rPr lang="en-US" smtClean="0"/>
               <a:pPr/>
-              <a:t>10/25/2024</a:t>
+              <a:t>10/16/2025</a:t>
             </a:fld>
             <a:endParaRPr lang="en-US"/>
           </a:p>
@@ -9597,7 +9587,7 @@
             <a:fld id="{0972D05C-DCFB-4BB6-B49C-AC126BF3ED2C}" type="datetimeFigureOut">
               <a:rPr lang="en-US" smtClean="0"/>
               <a:pPr/>
-              <a:t>10/25/2024</a:t>
+              <a:t>10/16/2025</a:t>
             </a:fld>
             <a:endParaRPr lang="en-US"/>
           </a:p>
@@ -9921,7 +9911,7 @@
             <a:fld id="{0972D05C-DCFB-4BB6-B49C-AC126BF3ED2C}" type="datetimeFigureOut">
               <a:rPr lang="en-US" smtClean="0"/>
               <a:pPr/>
-              <a:t>10/25/2024</a:t>
+              <a:t>10/16/2025</a:t>
             </a:fld>
             <a:endParaRPr lang="en-US"/>
           </a:p>
@@ -10044,6 +10034,13 @@
             <a:schemeClr val="lt1"/>
           </a:fontRef>
         </p:style>
+        <p:txBody>
+          <a:bodyPr/>
+          <a:lstStyle/>
+          <a:p>
+            <a:endParaRPr lang="en-US"/>
+          </a:p>
+        </p:txBody>
       </p:sp>
       <p:sp>
         <p:nvSpPr>
@@ -10176,7 +10173,7 @@
             <a:fld id="{0972D05C-DCFB-4BB6-B49C-AC126BF3ED2C}" type="datetimeFigureOut">
               <a:rPr lang="en-US" smtClean="0"/>
               <a:pPr/>
-              <a:t>10/25/2024</a:t>
+              <a:t>10/16/2025</a:t>
             </a:fld>
             <a:endParaRPr lang="en-US" dirty="0"/>
           </a:p>
@@ -10691,8 +10688,13 @@
           <a:p>
             <a:r>
               <a:rPr lang="en-US" dirty="0"/>
-              <a:t>Health Econometrics I </a:t>
-            </a:r>
+              <a:t>Quant Methods </a:t>
+            </a:r>
+            <a:r>
+              <a:rPr lang="en-US"/>
+              <a:t>in HSR I </a:t>
+            </a:r>
+            <a:endParaRPr lang="en-US" dirty="0"/>
           </a:p>
         </p:txBody>
       </p:sp>
@@ -10726,7 +10728,7 @@
           <a:p>
             <a:r>
               <a:rPr lang="en-US" sz="2400" dirty="0"/>
-              <a:t>October 25, 2024</a:t>
+              <a:t>October 20, 2025</a:t>
             </a:r>
           </a:p>
           <a:p>
@@ -25638,7 +25640,7 @@
               <a:rPr lang="en-US" sz="2400" dirty="0">
                 <a:cs typeface="Times New Roman" panose="02020603050405020304" pitchFamily="18" charset="0"/>
               </a:rPr>
-              <a:t>Economists tend to be </a:t>
+              <a:t>Some fields (economists) tend to be </a:t>
             </a:r>
             <a:r>
               <a:rPr lang="en-US" sz="2400" b="1" u="sng" dirty="0">
@@ -26357,7 +26359,7 @@
 </file>
 
 <file path=ppt/slides/slide68.xml><?xml version="1.0" encoding="utf-8"?>
-<p:sld xmlns:a="http://schemas.openxmlformats.org/drawingml/2006/main" xmlns:r="http://schemas.openxmlformats.org/officeDocument/2006/relationships" xmlns:p="http://schemas.openxmlformats.org/presentationml/2006/main">
+<p:sld xmlns:a="http://schemas.openxmlformats.org/drawingml/2006/main" xmlns:r="http://schemas.openxmlformats.org/officeDocument/2006/relationships" xmlns:p="http://schemas.openxmlformats.org/presentationml/2006/main" show="0">
   <p:cSld>
     <p:spTree>
       <p:nvGrpSpPr>
@@ -26496,7 +26498,7 @@
 </file>
 
 <file path=ppt/slides/slide69.xml><?xml version="1.0" encoding="utf-8"?>
-<p:sld xmlns:a="http://schemas.openxmlformats.org/drawingml/2006/main" xmlns:r="http://schemas.openxmlformats.org/officeDocument/2006/relationships" xmlns:p="http://schemas.openxmlformats.org/presentationml/2006/main">
+<p:sld xmlns:a="http://schemas.openxmlformats.org/drawingml/2006/main" xmlns:r="http://schemas.openxmlformats.org/officeDocument/2006/relationships" xmlns:p="http://schemas.openxmlformats.org/presentationml/2006/main" show="0">
   <p:cSld>
     <p:spTree>
       <p:nvGrpSpPr>

</xml_diff>